<commit_message>
anyadido el valor Special a las cartas
booleano que marca si una carta es especial o no.
retoques menores en las clases y limpieza de archivos inutiles
</commit_message>
<xml_diff>
--- a/app/src/powerpoint para cartas/Presentación1.pptx
+++ b/app/src/powerpoint para cartas/Presentación1.pptx
@@ -302,7 +302,7 @@
           <a:p>
             <a:fld id="{ED5068BE-CC48-4432-805D-8C4C4168F1D3}" type="datetimeFigureOut">
               <a:rPr lang="es-ES" smtClean="0"/>
-              <a:t>08/05/2020</a:t>
+              <a:t>16/05/2020</a:t>
             </a:fld>
             <a:endParaRPr lang="es-ES"/>
           </a:p>
@@ -465,7 +465,7 @@
           <a:p>
             <a:fld id="{ED5068BE-CC48-4432-805D-8C4C4168F1D3}" type="datetimeFigureOut">
               <a:rPr lang="es-ES" smtClean="0"/>
-              <a:t>08/05/2020</a:t>
+              <a:t>16/05/2020</a:t>
             </a:fld>
             <a:endParaRPr lang="es-ES"/>
           </a:p>
@@ -638,7 +638,7 @@
           <a:p>
             <a:fld id="{ED5068BE-CC48-4432-805D-8C4C4168F1D3}" type="datetimeFigureOut">
               <a:rPr lang="es-ES" smtClean="0"/>
-              <a:t>08/05/2020</a:t>
+              <a:t>16/05/2020</a:t>
             </a:fld>
             <a:endParaRPr lang="es-ES"/>
           </a:p>
@@ -801,7 +801,7 @@
           <a:p>
             <a:fld id="{ED5068BE-CC48-4432-805D-8C4C4168F1D3}" type="datetimeFigureOut">
               <a:rPr lang="es-ES" smtClean="0"/>
-              <a:t>08/05/2020</a:t>
+              <a:t>16/05/2020</a:t>
             </a:fld>
             <a:endParaRPr lang="es-ES"/>
           </a:p>
@@ -1041,7 +1041,7 @@
           <a:p>
             <a:fld id="{ED5068BE-CC48-4432-805D-8C4C4168F1D3}" type="datetimeFigureOut">
               <a:rPr lang="es-ES" smtClean="0"/>
-              <a:t>08/05/2020</a:t>
+              <a:t>16/05/2020</a:t>
             </a:fld>
             <a:endParaRPr lang="es-ES"/>
           </a:p>
@@ -1321,7 +1321,7 @@
           <a:p>
             <a:fld id="{ED5068BE-CC48-4432-805D-8C4C4168F1D3}" type="datetimeFigureOut">
               <a:rPr lang="es-ES" smtClean="0"/>
-              <a:t>08/05/2020</a:t>
+              <a:t>16/05/2020</a:t>
             </a:fld>
             <a:endParaRPr lang="es-ES"/>
           </a:p>
@@ -1735,7 +1735,7 @@
           <a:p>
             <a:fld id="{ED5068BE-CC48-4432-805D-8C4C4168F1D3}" type="datetimeFigureOut">
               <a:rPr lang="es-ES" smtClean="0"/>
-              <a:t>08/05/2020</a:t>
+              <a:t>16/05/2020</a:t>
             </a:fld>
             <a:endParaRPr lang="es-ES"/>
           </a:p>
@@ -1847,7 +1847,7 @@
           <a:p>
             <a:fld id="{ED5068BE-CC48-4432-805D-8C4C4168F1D3}" type="datetimeFigureOut">
               <a:rPr lang="es-ES" smtClean="0"/>
-              <a:t>08/05/2020</a:t>
+              <a:t>16/05/2020</a:t>
             </a:fld>
             <a:endParaRPr lang="es-ES"/>
           </a:p>
@@ -1937,7 +1937,7 @@
           <a:p>
             <a:fld id="{ED5068BE-CC48-4432-805D-8C4C4168F1D3}" type="datetimeFigureOut">
               <a:rPr lang="es-ES" smtClean="0"/>
-              <a:t>08/05/2020</a:t>
+              <a:t>16/05/2020</a:t>
             </a:fld>
             <a:endParaRPr lang="es-ES"/>
           </a:p>
@@ -2207,7 +2207,7 @@
           <a:p>
             <a:fld id="{ED5068BE-CC48-4432-805D-8C4C4168F1D3}" type="datetimeFigureOut">
               <a:rPr lang="es-ES" smtClean="0"/>
-              <a:t>08/05/2020</a:t>
+              <a:t>16/05/2020</a:t>
             </a:fld>
             <a:endParaRPr lang="es-ES"/>
           </a:p>
@@ -2454,7 +2454,7 @@
           <a:p>
             <a:fld id="{ED5068BE-CC48-4432-805D-8C4C4168F1D3}" type="datetimeFigureOut">
               <a:rPr lang="es-ES" smtClean="0"/>
-              <a:t>08/05/2020</a:t>
+              <a:t>16/05/2020</a:t>
             </a:fld>
             <a:endParaRPr lang="es-ES"/>
           </a:p>
@@ -2660,7 +2660,7 @@
           <a:p>
             <a:fld id="{ED5068BE-CC48-4432-805D-8C4C4168F1D3}" type="datetimeFigureOut">
               <a:rPr lang="es-ES" smtClean="0"/>
-              <a:t>08/05/2020</a:t>
+              <a:t>16/05/2020</a:t>
             </a:fld>
             <a:endParaRPr lang="es-ES"/>
           </a:p>
@@ -3038,10 +3038,10 @@
         </p:nvGrpSpPr>
         <p:grpSpPr>
           <a:xfrm>
-            <a:off x="2847975" y="857250"/>
-            <a:ext cx="3448050" cy="5143500"/>
-            <a:chOff x="2847975" y="857250"/>
-            <a:chExt cx="3448050" cy="5143500"/>
+            <a:off x="-129643" y="826662"/>
+            <a:ext cx="7067342" cy="5143500"/>
+            <a:chOff x="-771317" y="857250"/>
+            <a:chExt cx="7067342" cy="5143500"/>
           </a:xfrm>
         </p:grpSpPr>
         <p:grpSp>
@@ -3052,10 +3052,10 @@
           </p:nvGrpSpPr>
           <p:grpSpPr>
             <a:xfrm>
-              <a:off x="2847975" y="857250"/>
-              <a:ext cx="3448050" cy="5143500"/>
-              <a:chOff x="2847975" y="857250"/>
-              <a:chExt cx="3448050" cy="5143500"/>
+              <a:off x="-221541" y="857250"/>
+              <a:ext cx="6517566" cy="5143500"/>
+              <a:chOff x="-221541" y="857250"/>
+              <a:chExt cx="6517566" cy="5143500"/>
             </a:xfrm>
           </p:grpSpPr>
           <p:grpSp>
@@ -3066,10 +3066,10 @@
             </p:nvGrpSpPr>
             <p:grpSpPr>
               <a:xfrm>
-                <a:off x="2847975" y="857250"/>
-                <a:ext cx="3448050" cy="5143500"/>
-                <a:chOff x="2847975" y="857250"/>
-                <a:chExt cx="3448050" cy="5143500"/>
+                <a:off x="-221541" y="857250"/>
+                <a:ext cx="6517566" cy="5143500"/>
+                <a:chOff x="-221541" y="857250"/>
+                <a:chExt cx="6517566" cy="5143500"/>
               </a:xfrm>
             </p:grpSpPr>
             <p:grpSp>
@@ -3080,10 +3080,10 @@
               </p:nvGrpSpPr>
               <p:grpSpPr>
                 <a:xfrm>
-                  <a:off x="2847975" y="857250"/>
-                  <a:ext cx="3448050" cy="5143500"/>
-                  <a:chOff x="2847975" y="857250"/>
-                  <a:chExt cx="3448050" cy="5143500"/>
+                  <a:off x="-221541" y="857250"/>
+                  <a:ext cx="6517566" cy="5143500"/>
+                  <a:chOff x="-221541" y="857250"/>
+                  <a:chExt cx="6517566" cy="5143500"/>
                 </a:xfrm>
               </p:grpSpPr>
               <p:grpSp>
@@ -3094,10 +3094,10 @@
                 </p:nvGrpSpPr>
                 <p:grpSpPr>
                   <a:xfrm>
-                    <a:off x="2847975" y="857250"/>
-                    <a:ext cx="3448050" cy="5143500"/>
-                    <a:chOff x="2847975" y="857250"/>
-                    <a:chExt cx="3448050" cy="5143500"/>
+                    <a:off x="-221541" y="857250"/>
+                    <a:ext cx="6517566" cy="5143500"/>
+                    <a:chOff x="-221541" y="857250"/>
+                    <a:chExt cx="6517566" cy="5143500"/>
                   </a:xfrm>
                 </p:grpSpPr>
                 <p:grpSp>
@@ -3108,10 +3108,10 @@
                   </p:nvGrpSpPr>
                   <p:grpSpPr>
                     <a:xfrm>
-                      <a:off x="2847975" y="857250"/>
-                      <a:ext cx="3448050" cy="5143500"/>
-                      <a:chOff x="2847975" y="857250"/>
-                      <a:chExt cx="3448050" cy="5143500"/>
+                      <a:off x="-221541" y="857250"/>
+                      <a:ext cx="6517566" cy="5143500"/>
+                      <a:chOff x="-221541" y="857250"/>
+                      <a:chExt cx="6517566" cy="5143500"/>
                     </a:xfrm>
                   </p:grpSpPr>
                   <p:pic>
@@ -3223,7 +3223,7 @@
                     </p:blipFill>
                     <p:spPr bwMode="auto">
                       <a:xfrm>
-                        <a:off x="3214678" y="2143116"/>
+                        <a:off x="-221541" y="1921754"/>
                         <a:ext cx="2696482" cy="2428892"/>
                       </a:xfrm>
                       <a:prstGeom prst="rect">
@@ -3257,7 +3257,7 @@
                   </p:blipFill>
                   <p:spPr bwMode="auto">
                     <a:xfrm>
-                      <a:off x="3357554" y="2143116"/>
+                      <a:off x="199162" y="1835443"/>
                       <a:ext cx="2428892" cy="2471503"/>
                     </a:xfrm>
                     <a:prstGeom prst="rect">
@@ -3291,7 +3291,7 @@
                 </p:blipFill>
                 <p:spPr bwMode="auto">
                   <a:xfrm>
-                    <a:off x="3357554" y="2143116"/>
+                    <a:off x="160680" y="1690540"/>
                     <a:ext cx="2428892" cy="2493952"/>
                   </a:xfrm>
                   <a:prstGeom prst="rect">
@@ -3325,7 +3325,7 @@
               </p:blipFill>
               <p:spPr bwMode="auto">
                 <a:xfrm>
-                  <a:off x="3357554" y="2143116"/>
+                  <a:off x="-216066" y="1853428"/>
                   <a:ext cx="2428892" cy="2428892"/>
                 </a:xfrm>
                 <a:prstGeom prst="rect">
@@ -3359,7 +3359,7 @@
             </p:blipFill>
             <p:spPr bwMode="auto">
               <a:xfrm>
-                <a:off x="3357554" y="2071678"/>
+                <a:off x="29196" y="1759204"/>
                 <a:ext cx="2428892" cy="2568521"/>
               </a:xfrm>
               <a:prstGeom prst="rect">
@@ -3393,7 +3393,7 @@
           </p:blipFill>
           <p:spPr bwMode="auto">
             <a:xfrm>
-              <a:off x="3277035" y="2030016"/>
+              <a:off x="-771317" y="1668589"/>
               <a:ext cx="2571768" cy="2639446"/>
             </a:xfrm>
             <a:prstGeom prst="rect">
@@ -3438,7 +3438,7 @@
         </p:blipFill>
         <p:spPr>
           <a:xfrm>
-            <a:off x="3316688" y="2126521"/>
+            <a:off x="-289215" y="1959379"/>
             <a:ext cx="2696481" cy="2542941"/>
           </a:xfrm>
           <a:prstGeom prst="rect">
@@ -3474,7 +3474,7 @@
         </p:blipFill>
         <p:spPr>
           <a:xfrm>
-            <a:off x="3188701" y="2065260"/>
+            <a:off x="-82084" y="2106111"/>
             <a:ext cx="2706417" cy="2584603"/>
           </a:xfrm>
           <a:prstGeom prst="rect">
@@ -3510,12 +3510,57 @@
         </p:blipFill>
         <p:spPr>
           <a:xfrm>
-            <a:off x="2991283" y="1621320"/>
+            <a:off x="-397306" y="1647336"/>
             <a:ext cx="3143272" cy="3167029"/>
           </a:xfrm>
           <a:prstGeom prst="rect">
             <a:avLst/>
           </a:prstGeom>
+        </p:spPr>
+      </p:pic>
+      <p:pic>
+        <p:nvPicPr>
+          <p:cNvPr id="4" name="Imagen 3" descr="Imagen que contiene circuito, computadora&#10;&#10;Descripción generada automáticamente">
+            <a:extLst>
+              <a:ext uri="{FF2B5EF4-FFF2-40B4-BE49-F238E27FC236}">
+                <a16:creationId xmlns:a16="http://schemas.microsoft.com/office/drawing/2014/main" id="{E32AB8DA-9D2D-4FAD-9A19-290C629BCA7E}"/>
+              </a:ext>
+            </a:extLst>
+          </p:cNvPr>
+          <p:cNvPicPr>
+            <a:picLocks noChangeAspect="1"/>
+          </p:cNvPicPr>
+          <p:nvPr/>
+        </p:nvPicPr>
+        <p:blipFill rotWithShape="1">
+          <a:blip r:embed="rId12">
+            <a:extLst>
+              <a:ext uri="{28A0092B-C50C-407E-A947-70E740481C1C}">
+                <a14:useLocalDpi xmlns:a14="http://schemas.microsoft.com/office/drawing/2010/main" val="0"/>
+              </a:ext>
+            </a:extLst>
+          </a:blip>
+          <a:srcRect l="4061" t="3234" r="4051" b="4743"/>
+          <a:stretch/>
+        </p:blipFill>
+        <p:spPr>
+          <a:xfrm>
+            <a:off x="3644268" y="1000108"/>
+            <a:ext cx="3143271" cy="4857784"/>
+          </a:xfrm>
+          <a:prstGeom prst="rect">
+            <a:avLst/>
+          </a:prstGeom>
+          <a:ln>
+            <a:noFill/>
+          </a:ln>
+          <a:effectLst>
+            <a:outerShdw blurRad="292100" dist="139700" dir="2700000" algn="tl" rotWithShape="0">
+              <a:srgbClr val="333333">
+                <a:alpha val="65000"/>
+              </a:srgbClr>
+            </a:outerShdw>
+          </a:effectLst>
         </p:spPr>
       </p:pic>
       <p:pic>
@@ -3533,7 +3578,7 @@
           <p:nvPr/>
         </p:nvPicPr>
         <p:blipFill>
-          <a:blip r:embed="rId12">
+          <a:blip r:embed="rId13">
             <a:extLst>
               <a:ext uri="{28A0092B-C50C-407E-A947-70E740481C1C}">
                 <a14:useLocalDpi xmlns:a14="http://schemas.microsoft.com/office/drawing/2010/main" val="0"/>
@@ -3546,7 +3591,7 @@
         </p:blipFill>
         <p:spPr>
           <a:xfrm>
-            <a:off x="3124646" y="1766224"/>
+            <a:off x="-262527" y="1792240"/>
             <a:ext cx="2887514" cy="2877222"/>
           </a:xfrm>
           <a:prstGeom prst="rect">

</xml_diff>

<commit_message>
cartas especiales + desafio perfecto minFails
</commit_message>
<xml_diff>
--- a/app/src/powerpoint para cartas/Presentación1.pptx
+++ b/app/src/powerpoint para cartas/Presentación1.pptx
@@ -302,7 +302,7 @@
           <a:p>
             <a:fld id="{ED5068BE-CC48-4432-805D-8C4C4168F1D3}" type="datetimeFigureOut">
               <a:rPr lang="es-ES" smtClean="0"/>
-              <a:t>16/05/2020</a:t>
+              <a:t>19/05/2020</a:t>
             </a:fld>
             <a:endParaRPr lang="es-ES"/>
           </a:p>
@@ -465,7 +465,7 @@
           <a:p>
             <a:fld id="{ED5068BE-CC48-4432-805D-8C4C4168F1D3}" type="datetimeFigureOut">
               <a:rPr lang="es-ES" smtClean="0"/>
-              <a:t>16/05/2020</a:t>
+              <a:t>19/05/2020</a:t>
             </a:fld>
             <a:endParaRPr lang="es-ES"/>
           </a:p>
@@ -638,7 +638,7 @@
           <a:p>
             <a:fld id="{ED5068BE-CC48-4432-805D-8C4C4168F1D3}" type="datetimeFigureOut">
               <a:rPr lang="es-ES" smtClean="0"/>
-              <a:t>16/05/2020</a:t>
+              <a:t>19/05/2020</a:t>
             </a:fld>
             <a:endParaRPr lang="es-ES"/>
           </a:p>
@@ -801,7 +801,7 @@
           <a:p>
             <a:fld id="{ED5068BE-CC48-4432-805D-8C4C4168F1D3}" type="datetimeFigureOut">
               <a:rPr lang="es-ES" smtClean="0"/>
-              <a:t>16/05/2020</a:t>
+              <a:t>19/05/2020</a:t>
             </a:fld>
             <a:endParaRPr lang="es-ES"/>
           </a:p>
@@ -1041,7 +1041,7 @@
           <a:p>
             <a:fld id="{ED5068BE-CC48-4432-805D-8C4C4168F1D3}" type="datetimeFigureOut">
               <a:rPr lang="es-ES" smtClean="0"/>
-              <a:t>16/05/2020</a:t>
+              <a:t>19/05/2020</a:t>
             </a:fld>
             <a:endParaRPr lang="es-ES"/>
           </a:p>
@@ -1321,7 +1321,7 @@
           <a:p>
             <a:fld id="{ED5068BE-CC48-4432-805D-8C4C4168F1D3}" type="datetimeFigureOut">
               <a:rPr lang="es-ES" smtClean="0"/>
-              <a:t>16/05/2020</a:t>
+              <a:t>19/05/2020</a:t>
             </a:fld>
             <a:endParaRPr lang="es-ES"/>
           </a:p>
@@ -1735,7 +1735,7 @@
           <a:p>
             <a:fld id="{ED5068BE-CC48-4432-805D-8C4C4168F1D3}" type="datetimeFigureOut">
               <a:rPr lang="es-ES" smtClean="0"/>
-              <a:t>16/05/2020</a:t>
+              <a:t>19/05/2020</a:t>
             </a:fld>
             <a:endParaRPr lang="es-ES"/>
           </a:p>
@@ -1847,7 +1847,7 @@
           <a:p>
             <a:fld id="{ED5068BE-CC48-4432-805D-8C4C4168F1D3}" type="datetimeFigureOut">
               <a:rPr lang="es-ES" smtClean="0"/>
-              <a:t>16/05/2020</a:t>
+              <a:t>19/05/2020</a:t>
             </a:fld>
             <a:endParaRPr lang="es-ES"/>
           </a:p>
@@ -1937,7 +1937,7 @@
           <a:p>
             <a:fld id="{ED5068BE-CC48-4432-805D-8C4C4168F1D3}" type="datetimeFigureOut">
               <a:rPr lang="es-ES" smtClean="0"/>
-              <a:t>16/05/2020</a:t>
+              <a:t>19/05/2020</a:t>
             </a:fld>
             <a:endParaRPr lang="es-ES"/>
           </a:p>
@@ -2207,7 +2207,7 @@
           <a:p>
             <a:fld id="{ED5068BE-CC48-4432-805D-8C4C4168F1D3}" type="datetimeFigureOut">
               <a:rPr lang="es-ES" smtClean="0"/>
-              <a:t>16/05/2020</a:t>
+              <a:t>19/05/2020</a:t>
             </a:fld>
             <a:endParaRPr lang="es-ES"/>
           </a:p>
@@ -2454,7 +2454,7 @@
           <a:p>
             <a:fld id="{ED5068BE-CC48-4432-805D-8C4C4168F1D3}" type="datetimeFigureOut">
               <a:rPr lang="es-ES" smtClean="0"/>
-              <a:t>16/05/2020</a:t>
+              <a:t>19/05/2020</a:t>
             </a:fld>
             <a:endParaRPr lang="es-ES"/>
           </a:p>
@@ -2660,7 +2660,7 @@
           <a:p>
             <a:fld id="{ED5068BE-CC48-4432-805D-8C4C4168F1D3}" type="datetimeFigureOut">
               <a:rPr lang="es-ES" smtClean="0"/>
-              <a:t>16/05/2020</a:t>
+              <a:t>19/05/2020</a:t>
             </a:fld>
             <a:endParaRPr lang="es-ES"/>
           </a:p>
@@ -3038,7 +3038,7 @@
         </p:nvGrpSpPr>
         <p:grpSpPr>
           <a:xfrm>
-            <a:off x="-129643" y="826662"/>
+            <a:off x="1142235" y="824130"/>
             <a:ext cx="7067342" cy="5143500"/>
             <a:chOff x="-771317" y="857250"/>
             <a:chExt cx="7067342" cy="5143500"/>
@@ -3545,7 +3545,7 @@
         </p:blipFill>
         <p:spPr>
           <a:xfrm>
-            <a:off x="3644268" y="1000108"/>
+            <a:off x="-112947" y="826662"/>
             <a:ext cx="3143271" cy="4857784"/>
           </a:xfrm>
           <a:prstGeom prst="rect">
@@ -3593,6 +3593,114 @@
           <a:xfrm>
             <a:off x="-262527" y="1792240"/>
             <a:ext cx="2887514" cy="2877222"/>
+          </a:xfrm>
+          <a:prstGeom prst="rect">
+            <a:avLst/>
+          </a:prstGeom>
+        </p:spPr>
+      </p:pic>
+      <p:pic>
+        <p:nvPicPr>
+          <p:cNvPr id="10" name="Imagen 9" descr="Imagen que contiene luz, iluminado, tabla, oscuro&#10;&#10;Descripción generada automáticamente">
+            <a:extLst>
+              <a:ext uri="{FF2B5EF4-FFF2-40B4-BE49-F238E27FC236}">
+                <a16:creationId xmlns:a16="http://schemas.microsoft.com/office/drawing/2014/main" id="{E275F625-96AA-4013-9807-9D4059964DCE}"/>
+              </a:ext>
+            </a:extLst>
+          </p:cNvPr>
+          <p:cNvPicPr>
+            <a:picLocks noChangeAspect="1"/>
+          </p:cNvPicPr>
+          <p:nvPr/>
+        </p:nvPicPr>
+        <p:blipFill>
+          <a:blip r:embed="rId14">
+            <a:extLst>
+              <a:ext uri="{28A0092B-C50C-407E-A947-70E740481C1C}">
+                <a14:useLocalDpi xmlns:a14="http://schemas.microsoft.com/office/drawing/2010/main" val="0"/>
+              </a:ext>
+            </a:extLst>
+          </a:blip>
+          <a:stretch>
+            <a:fillRect/>
+          </a:stretch>
+        </p:blipFill>
+        <p:spPr>
+          <a:xfrm>
+            <a:off x="85385" y="2212500"/>
+            <a:ext cx="2428891" cy="2428891"/>
+          </a:xfrm>
+          <a:prstGeom prst="rect">
+            <a:avLst/>
+          </a:prstGeom>
+        </p:spPr>
+      </p:pic>
+      <p:pic>
+        <p:nvPicPr>
+          <p:cNvPr id="13" name="Imagen 12" descr="Imagen que contiene casco, dibujo&#10;&#10;Descripción generada automáticamente">
+            <a:extLst>
+              <a:ext uri="{FF2B5EF4-FFF2-40B4-BE49-F238E27FC236}">
+                <a16:creationId xmlns:a16="http://schemas.microsoft.com/office/drawing/2014/main" id="{5DE9CC4A-8F72-4355-8663-A4309D830EA6}"/>
+              </a:ext>
+            </a:extLst>
+          </p:cNvPr>
+          <p:cNvPicPr>
+            <a:picLocks noChangeAspect="1"/>
+          </p:cNvPicPr>
+          <p:nvPr/>
+        </p:nvPicPr>
+        <p:blipFill>
+          <a:blip r:embed="rId15">
+            <a:extLst>
+              <a:ext uri="{28A0092B-C50C-407E-A947-70E740481C1C}">
+                <a14:useLocalDpi xmlns:a14="http://schemas.microsoft.com/office/drawing/2010/main" val="0"/>
+              </a:ext>
+            </a:extLst>
+          </a:blip>
+          <a:stretch>
+            <a:fillRect/>
+          </a:stretch>
+        </p:blipFill>
+        <p:spPr>
+          <a:xfrm>
+            <a:off x="101402" y="2392190"/>
+            <a:ext cx="2214458" cy="2214458"/>
+          </a:xfrm>
+          <a:prstGeom prst="rect">
+            <a:avLst/>
+          </a:prstGeom>
+        </p:spPr>
+      </p:pic>
+      <p:pic>
+        <p:nvPicPr>
+          <p:cNvPr id="16" name="Imagen 15" descr="Imagen que contiene lámpara, luz&#10;&#10;Descripción generada automáticamente">
+            <a:extLst>
+              <a:ext uri="{FF2B5EF4-FFF2-40B4-BE49-F238E27FC236}">
+                <a16:creationId xmlns:a16="http://schemas.microsoft.com/office/drawing/2014/main" id="{45065EAD-8DA0-42DB-AD5A-84D7B379C913}"/>
+              </a:ext>
+            </a:extLst>
+          </p:cNvPr>
+          <p:cNvPicPr>
+            <a:picLocks noChangeAspect="1"/>
+          </p:cNvPicPr>
+          <p:nvPr/>
+        </p:nvPicPr>
+        <p:blipFill>
+          <a:blip r:embed="rId16">
+            <a:extLst>
+              <a:ext uri="{28A0092B-C50C-407E-A947-70E740481C1C}">
+                <a14:useLocalDpi xmlns:a14="http://schemas.microsoft.com/office/drawing/2010/main" val="0"/>
+              </a:ext>
+            </a:extLst>
+          </a:blip>
+          <a:stretch>
+            <a:fillRect/>
+          </a:stretch>
+        </p:blipFill>
+        <p:spPr>
+          <a:xfrm>
+            <a:off x="5329453" y="2269552"/>
+            <a:ext cx="2312197" cy="2312197"/>
           </a:xfrm>
           <a:prstGeom prst="rect">
             <a:avLst/>

</xml_diff>